<commit_message>
Deployed fe86b1a with MkDocs version: 1.0.4
</commit_message>
<xml_diff>
--- a/mm2-diagrams.pptx
+++ b/mm2-diagrams.pptx
@@ -223,7 +223,7 @@
           <a:p>
             <a:fld id="{43B1B1F9-D0CB-FF4D-BEE0-BED1F1FDA196}" type="datetimeFigureOut">
               <a:rPr lang="en-US" smtClean="0"/>
-              <a:t>3/10/20</a:t>
+              <a:t>3/11/20</a:t>
             </a:fld>
             <a:endParaRPr lang="en-US"/>
           </a:p>
@@ -388,7 +388,7 @@
           <a:p>
             <a:fld id="{26BE012A-D992-5D42-B86E-AA2BC0764EE1}" type="datetimeFigureOut">
               <a:rPr lang="en-US" smtClean="0"/>
-              <a:t>3/10/20</a:t>
+              <a:t>3/11/20</a:t>
             </a:fld>
             <a:endParaRPr lang="en-US"/>
           </a:p>
@@ -2769,14 +2769,14 @@
           </a:ln>
           <a:extLst>
             <a:ext uri="{909E8E84-426E-40dd-AFC4-6F175D3DCCD1}">
-              <a14:hiddenFill xmlns="" xmlns:a14="http://schemas.microsoft.com/office/drawing/2010/main">
+              <a14:hiddenFill xmlns:a14="http://schemas.microsoft.com/office/drawing/2010/main" xmlns="">
                 <a:solidFill>
                   <a:srgbClr val="FFFFFF"/>
                 </a:solidFill>
               </a14:hiddenFill>
             </a:ext>
             <a:ext uri="{91240B29-F687-4f45-9708-019B960494DF}">
-              <a14:hiddenLine xmlns="" xmlns:a14="http://schemas.microsoft.com/office/drawing/2010/main" w="9525">
+              <a14:hiddenLine xmlns:a14="http://schemas.microsoft.com/office/drawing/2010/main" xmlns="" w="9525">
                 <a:solidFill>
                   <a:srgbClr val="000000"/>
                 </a:solidFill>
@@ -2828,14 +2828,14 @@
           <a:effectLst/>
           <a:extLst>
             <a:ext uri="{909E8E84-426E-40dd-AFC4-6F175D3DCCD1}">
-              <a14:hiddenFill xmlns="" xmlns:a14="http://schemas.microsoft.com/office/drawing/2010/main">
+              <a14:hiddenFill xmlns:a14="http://schemas.microsoft.com/office/drawing/2010/main" xmlns="">
                 <a:solidFill>
                   <a:schemeClr val="accent1"/>
                 </a:solidFill>
               </a14:hiddenFill>
             </a:ext>
             <a:ext uri="{91240B29-F687-4f45-9708-019B960494DF}">
-              <a14:hiddenLine xmlns="" xmlns:a14="http://schemas.microsoft.com/office/drawing/2010/main" w="9525">
+              <a14:hiddenLine xmlns:a14="http://schemas.microsoft.com/office/drawing/2010/main" xmlns="" w="9525">
                 <a:solidFill>
                   <a:schemeClr val="tx1"/>
                 </a:solidFill>
@@ -2845,7 +2845,7 @@
               </a14:hiddenLine>
             </a:ext>
             <a:ext uri="{AF507438-7753-43e0-B8FC-AC1667EBCBE1}">
-              <a14:hiddenEffects xmlns="" xmlns:a14="http://schemas.microsoft.com/office/drawing/2010/main">
+              <a14:hiddenEffects xmlns:a14="http://schemas.microsoft.com/office/drawing/2010/main" xmlns="">
                 <a:effectLst>
                   <a:outerShdw blurRad="63500" dist="38099" dir="2700000" algn="ctr" rotWithShape="0">
                     <a:schemeClr val="bg2">
@@ -3561,10 +3561,10 @@
           </a:ln>
           <a:extLst>
             <a:ext uri="{FAA26D3D-D897-4be2-8F04-BA451C77F1D7}">
-              <ma14:placeholderFlag xmlns:ma14="http://schemas.microsoft.com/office/mac/drawingml/2011/main" xmlns="" val="1"/>
+              <ma14:placeholderFlag xmlns="" xmlns:ma14="http://schemas.microsoft.com/office/mac/drawingml/2011/main" val="1"/>
             </a:ext>
             <a:ext uri="{909E8E84-426E-40dd-AFC4-6F175D3DCCD1}">
-              <a14:hiddenFill xmlns:a14="http://schemas.microsoft.com/office/drawing/2010/main" xmlns="">
+              <a14:hiddenFill xmlns="" xmlns:a14="http://schemas.microsoft.com/office/drawing/2010/main">
                 <a:solidFill>
                   <a:srgbClr val="FFFFFF"/>
                 </a:solidFill>
@@ -3615,10 +3615,10 @@
           </a:ln>
           <a:extLst>
             <a:ext uri="{FAA26D3D-D897-4be2-8F04-BA451C77F1D7}">
-              <ma14:placeholderFlag xmlns:ma14="http://schemas.microsoft.com/office/mac/drawingml/2011/main" xmlns="" val="1"/>
+              <ma14:placeholderFlag xmlns="" xmlns:ma14="http://schemas.microsoft.com/office/mac/drawingml/2011/main" val="1"/>
             </a:ext>
             <a:ext uri="{909E8E84-426E-40dd-AFC4-6F175D3DCCD1}">
-              <a14:hiddenFill xmlns:a14="http://schemas.microsoft.com/office/drawing/2010/main" xmlns="">
+              <a14:hiddenFill xmlns="" xmlns:a14="http://schemas.microsoft.com/office/drawing/2010/main">
                 <a:solidFill>
                   <a:srgbClr val="FFFFFF"/>
                 </a:solidFill>
@@ -14690,36 +14690,6 @@
           </a:prstGeom>
         </p:spPr>
       </p:pic>
-      <p:pic>
-        <p:nvPicPr>
-          <p:cNvPr id="37" name="Picture 36">
-            <a:extLst>
-              <a:ext uri="{FF2B5EF4-FFF2-40B4-BE49-F238E27FC236}">
-                <a16:creationId xmlns:a16="http://schemas.microsoft.com/office/drawing/2014/main" id="{6D8F6862-7739-D946-A521-B5976D86EED8}"/>
-              </a:ext>
-            </a:extLst>
-          </p:cNvPr>
-          <p:cNvPicPr>
-            <a:picLocks noChangeAspect="1"/>
-          </p:cNvPicPr>
-          <p:nvPr/>
-        </p:nvPicPr>
-        <p:blipFill>
-          <a:blip r:embed="rId4"/>
-          <a:stretch>
-            <a:fillRect/>
-          </a:stretch>
-        </p:blipFill>
-        <p:spPr>
-          <a:xfrm>
-            <a:off x="1956920" y="2941013"/>
-            <a:ext cx="376238" cy="371475"/>
-          </a:xfrm>
-          <a:prstGeom prst="rect">
-            <a:avLst/>
-          </a:prstGeom>
-        </p:spPr>
-      </p:pic>
       <p:sp>
         <p:nvSpPr>
           <p:cNvPr id="54" name="Rounded Rectangle 53">
@@ -16108,6 +16078,78 @@
           </a:fontRef>
         </p:style>
       </p:cxnSp>
+      <p:sp>
+        <p:nvSpPr>
+          <p:cNvPr id="72" name="TextBox 71">
+            <a:extLst>
+              <a:ext uri="{FF2B5EF4-FFF2-40B4-BE49-F238E27FC236}">
+                <a16:creationId xmlns:a16="http://schemas.microsoft.com/office/drawing/2014/main" id="{0EBAAD39-80D0-5549-8180-F3A0C0565822}"/>
+              </a:ext>
+            </a:extLst>
+          </p:cNvPr>
+          <p:cNvSpPr txBox="1"/>
+          <p:nvPr/>
+        </p:nvSpPr>
+        <p:spPr>
+          <a:xfrm>
+            <a:off x="1258848" y="1463746"/>
+            <a:ext cx="673582" cy="246221"/>
+          </a:xfrm>
+          <a:prstGeom prst="rect">
+            <a:avLst/>
+          </a:prstGeom>
+          <a:noFill/>
+        </p:spPr>
+        <p:txBody>
+          <a:bodyPr wrap="none" rtlCol="0">
+            <a:spAutoFit/>
+          </a:bodyPr>
+          <a:lstStyle/>
+          <a:p>
+            <a:r>
+              <a:rPr lang="en-US" sz="1000" dirty="0"/>
+              <a:t>products</a:t>
+            </a:r>
+            <a:endParaRPr sz="1000" dirty="0"/>
+          </a:p>
+        </p:txBody>
+      </p:sp>
+      <p:sp>
+        <p:nvSpPr>
+          <p:cNvPr id="73" name="TextBox 72">
+            <a:extLst>
+              <a:ext uri="{FF2B5EF4-FFF2-40B4-BE49-F238E27FC236}">
+                <a16:creationId xmlns:a16="http://schemas.microsoft.com/office/drawing/2014/main" id="{78E8CCC5-9C76-5345-BDCB-1F1DD5A80BA4}"/>
+              </a:ext>
+            </a:extLst>
+          </p:cNvPr>
+          <p:cNvSpPr txBox="1"/>
+          <p:nvPr/>
+        </p:nvSpPr>
+        <p:spPr>
+          <a:xfrm>
+            <a:off x="6329859" y="1423157"/>
+            <a:ext cx="1091966" cy="246221"/>
+          </a:xfrm>
+          <a:prstGeom prst="rect">
+            <a:avLst/>
+          </a:prstGeom>
+          <a:noFill/>
+        </p:spPr>
+        <p:txBody>
+          <a:bodyPr wrap="none" rtlCol="0">
+            <a:spAutoFit/>
+          </a:bodyPr>
+          <a:lstStyle/>
+          <a:p>
+            <a:r>
+              <a:rPr lang="en-US" sz="1000" dirty="0"/>
+              <a:t>source.products</a:t>
+            </a:r>
+            <a:endParaRPr sz="1000" dirty="0"/>
+          </a:p>
+        </p:txBody>
+      </p:sp>
     </p:spTree>
     <p:extLst>
       <p:ext uri="{BB962C8B-B14F-4D97-AF65-F5344CB8AC3E}">
@@ -18621,6 +18663,9 @@
             <a:chOff x="4142228" y="2170290"/>
             <a:chExt cx="734098" cy="548634"/>
           </a:xfrm>
+          <a:solidFill>
+            <a:schemeClr val="accent2"/>
+          </a:solidFill>
         </p:grpSpPr>
         <p:sp>
           <p:nvSpPr>
@@ -18642,12 +18687,7 @@
             <a:prstGeom prst="roundRect">
               <a:avLst/>
             </a:prstGeom>
-            <a:solidFill>
-              <a:schemeClr val="accent5">
-                <a:lumMod val="60000"/>
-                <a:lumOff val="40000"/>
-              </a:schemeClr>
-            </a:solidFill>
+            <a:grpFill/>
             <a:ln>
               <a:solidFill>
                 <a:schemeClr val="bg1"/>
@@ -18730,12 +18770,7 @@
             <a:prstGeom prst="roundRect">
               <a:avLst/>
             </a:prstGeom>
-            <a:solidFill>
-              <a:schemeClr val="accent5">
-                <a:lumMod val="60000"/>
-                <a:lumOff val="40000"/>
-              </a:schemeClr>
-            </a:solidFill>
+            <a:grpFill/>
             <a:ln>
               <a:solidFill>
                 <a:schemeClr val="bg1"/>
@@ -18818,12 +18853,7 @@
             <a:prstGeom prst="roundRect">
               <a:avLst/>
             </a:prstGeom>
-            <a:solidFill>
-              <a:schemeClr val="accent5">
-                <a:lumMod val="60000"/>
-                <a:lumOff val="40000"/>
-              </a:schemeClr>
-            </a:solidFill>
+            <a:grpFill/>
             <a:ln>
               <a:solidFill>
                 <a:schemeClr val="bg1"/>
@@ -18906,12 +18936,7 @@
             <a:prstGeom prst="roundRect">
               <a:avLst/>
             </a:prstGeom>
-            <a:solidFill>
-              <a:schemeClr val="accent5">
-                <a:lumMod val="60000"/>
-                <a:lumOff val="40000"/>
-              </a:schemeClr>
-            </a:solidFill>
+            <a:grpFill/>
             <a:ln>
               <a:solidFill>
                 <a:schemeClr val="bg1"/>
@@ -18994,6 +19019,9 @@
             <a:chOff x="4142228" y="2170290"/>
             <a:chExt cx="734098" cy="548634"/>
           </a:xfrm>
+          <a:solidFill>
+            <a:schemeClr val="accent2"/>
+          </a:solidFill>
         </p:grpSpPr>
         <p:sp>
           <p:nvSpPr>
@@ -19015,12 +19043,7 @@
             <a:prstGeom prst="roundRect">
               <a:avLst/>
             </a:prstGeom>
-            <a:solidFill>
-              <a:schemeClr val="accent5">
-                <a:lumMod val="60000"/>
-                <a:lumOff val="40000"/>
-              </a:schemeClr>
-            </a:solidFill>
+            <a:grpFill/>
             <a:ln>
               <a:solidFill>
                 <a:schemeClr val="bg1"/>
@@ -19103,12 +19126,7 @@
             <a:prstGeom prst="roundRect">
               <a:avLst/>
             </a:prstGeom>
-            <a:solidFill>
-              <a:schemeClr val="accent5">
-                <a:lumMod val="60000"/>
-                <a:lumOff val="40000"/>
-              </a:schemeClr>
-            </a:solidFill>
+            <a:grpFill/>
             <a:ln>
               <a:solidFill>
                 <a:schemeClr val="bg1"/>
@@ -19191,12 +19209,7 @@
             <a:prstGeom prst="roundRect">
               <a:avLst/>
             </a:prstGeom>
-            <a:solidFill>
-              <a:schemeClr val="accent5">
-                <a:lumMod val="60000"/>
-                <a:lumOff val="40000"/>
-              </a:schemeClr>
-            </a:solidFill>
+            <a:grpFill/>
             <a:ln>
               <a:solidFill>
                 <a:schemeClr val="bg1"/>
@@ -19279,12 +19292,7 @@
             <a:prstGeom prst="roundRect">
               <a:avLst/>
             </a:prstGeom>
-            <a:solidFill>
-              <a:schemeClr val="accent5">
-                <a:lumMod val="60000"/>
-                <a:lumOff val="40000"/>
-              </a:schemeClr>
-            </a:solidFill>
+            <a:grpFill/>
             <a:ln>
               <a:solidFill>
                 <a:schemeClr val="bg1"/>
@@ -20636,8 +20644,8 @@
         </p:nvSpPr>
         <p:spPr>
           <a:xfrm rot="16200000">
-            <a:off x="6934301" y="2441440"/>
-            <a:ext cx="309314" cy="1137314"/>
+            <a:off x="7022901" y="2352839"/>
+            <a:ext cx="309314" cy="1314515"/>
           </a:xfrm>
           <a:prstGeom prst="can">
             <a:avLst/>
@@ -20683,7 +20691,7 @@
               </a:spcAft>
             </a:pPr>
             <a:r>
-              <a:rPr lang="en-US" sz="1000" b="1" err="1">
+              <a:rPr lang="en-US" sz="1000" b="1" dirty="0">
                 <a:solidFill>
                   <a:schemeClr val="accent4">
                     <a:lumMod val="75000"/>
@@ -20691,16 +20699,8 @@
                 </a:solidFill>
                 <a:latin typeface="Arial"/>
               </a:rPr>
-              <a:t>source.orders</a:t>
-            </a:r>
-            <a:endParaRPr lang="en-US" sz="1000" b="1">
-              <a:solidFill>
-                <a:schemeClr val="accent4">
-                  <a:lumMod val="75000"/>
-                </a:schemeClr>
-              </a:solidFill>
-              <a:latin typeface="Arial"/>
-            </a:endParaRPr>
+              <a:t>source.products</a:t>
+            </a:r>
           </a:p>
         </p:txBody>
       </p:sp>
@@ -21204,7 +21204,7 @@
               </a:spcAft>
             </a:pPr>
             <a:r>
-              <a:rPr lang="en-US" sz="1000" b="1">
+              <a:rPr lang="en-US" sz="1000" b="1" dirty="0">
                 <a:solidFill>
                   <a:schemeClr val="accent4">
                     <a:lumMod val="75000"/>
@@ -21212,7 +21212,7 @@
                 </a:solidFill>
                 <a:latin typeface="Arial"/>
               </a:rPr>
-              <a:t>Orders</a:t>
+              <a:t>products</a:t>
             </a:r>
           </a:p>
         </p:txBody>
@@ -23887,10 +23887,9 @@
           <a:lstStyle/>
           <a:p>
             <a:r>
-              <a:rPr lang="en-US" sz="750" b="1" dirty="0" err="1"/>
+              <a:rPr lang="en-US" sz="750" b="1" dirty="0"/>
               <a:t>source.orders</a:t>
             </a:r>
-            <a:endParaRPr lang="en-US" sz="750" b="1" dirty="0"/>
           </a:p>
         </p:txBody>
       </p:sp>
@@ -26256,10 +26255,9 @@
           <a:lstStyle/>
           <a:p>
             <a:r>
-              <a:rPr lang="en-US" sz="750" b="1" dirty="0" err="1"/>
+              <a:rPr lang="en-US" sz="750" b="1" dirty="0"/>
               <a:t>source.orders</a:t>
             </a:r>
-            <a:endParaRPr lang="en-US" sz="750" b="1" dirty="0"/>
           </a:p>
         </p:txBody>
       </p:sp>

</xml_diff>

<commit_message>
Deployed ee74ce7 with MkDocs version: 1.0.4
</commit_message>
<xml_diff>
--- a/mm2-diagrams.pptx
+++ b/mm2-diagrams.pptx
@@ -223,7 +223,7 @@
           <a:p>
             <a:fld id="{43B1B1F9-D0CB-FF4D-BEE0-BED1F1FDA196}" type="datetimeFigureOut">
               <a:rPr lang="en-US" smtClean="0"/>
-              <a:t>3/11/20</a:t>
+              <a:t>3/12/20</a:t>
             </a:fld>
             <a:endParaRPr lang="en-US"/>
           </a:p>
@@ -388,7 +388,7 @@
           <a:p>
             <a:fld id="{26BE012A-D992-5D42-B86E-AA2BC0764EE1}" type="datetimeFigureOut">
               <a:rPr lang="en-US" smtClean="0"/>
-              <a:t>3/11/20</a:t>
+              <a:t>3/12/20</a:t>
             </a:fld>
             <a:endParaRPr lang="en-US"/>
           </a:p>
@@ -2769,14 +2769,14 @@
           </a:ln>
           <a:extLst>
             <a:ext uri="{909E8E84-426E-40dd-AFC4-6F175D3DCCD1}">
-              <a14:hiddenFill xmlns:a14="http://schemas.microsoft.com/office/drawing/2010/main" xmlns="">
+              <a14:hiddenFill xmlns="" xmlns:a14="http://schemas.microsoft.com/office/drawing/2010/main">
                 <a:solidFill>
                   <a:srgbClr val="FFFFFF"/>
                 </a:solidFill>
               </a14:hiddenFill>
             </a:ext>
             <a:ext uri="{91240B29-F687-4f45-9708-019B960494DF}">
-              <a14:hiddenLine xmlns:a14="http://schemas.microsoft.com/office/drawing/2010/main" xmlns="" w="9525">
+              <a14:hiddenLine xmlns="" xmlns:a14="http://schemas.microsoft.com/office/drawing/2010/main" w="9525">
                 <a:solidFill>
                   <a:srgbClr val="000000"/>
                 </a:solidFill>
@@ -2828,14 +2828,14 @@
           <a:effectLst/>
           <a:extLst>
             <a:ext uri="{909E8E84-426E-40dd-AFC4-6F175D3DCCD1}">
-              <a14:hiddenFill xmlns:a14="http://schemas.microsoft.com/office/drawing/2010/main" xmlns="">
+              <a14:hiddenFill xmlns="" xmlns:a14="http://schemas.microsoft.com/office/drawing/2010/main">
                 <a:solidFill>
                   <a:schemeClr val="accent1"/>
                 </a:solidFill>
               </a14:hiddenFill>
             </a:ext>
             <a:ext uri="{91240B29-F687-4f45-9708-019B960494DF}">
-              <a14:hiddenLine xmlns:a14="http://schemas.microsoft.com/office/drawing/2010/main" xmlns="" w="9525">
+              <a14:hiddenLine xmlns="" xmlns:a14="http://schemas.microsoft.com/office/drawing/2010/main" w="9525">
                 <a:solidFill>
                   <a:schemeClr val="tx1"/>
                 </a:solidFill>
@@ -2845,7 +2845,7 @@
               </a14:hiddenLine>
             </a:ext>
             <a:ext uri="{AF507438-7753-43e0-B8FC-AC1667EBCBE1}">
-              <a14:hiddenEffects xmlns:a14="http://schemas.microsoft.com/office/drawing/2010/main" xmlns="">
+              <a14:hiddenEffects xmlns="" xmlns:a14="http://schemas.microsoft.com/office/drawing/2010/main">
                 <a:effectLst>
                   <a:outerShdw blurRad="63500" dist="38099" dir="2700000" algn="ctr" rotWithShape="0">
                     <a:schemeClr val="bg2">
@@ -3561,10 +3561,10 @@
           </a:ln>
           <a:extLst>
             <a:ext uri="{FAA26D3D-D897-4be2-8F04-BA451C77F1D7}">
-              <ma14:placeholderFlag xmlns="" xmlns:ma14="http://schemas.microsoft.com/office/mac/drawingml/2011/main" val="1"/>
+              <ma14:placeholderFlag xmlns:ma14="http://schemas.microsoft.com/office/mac/drawingml/2011/main" xmlns="" val="1"/>
             </a:ext>
             <a:ext uri="{909E8E84-426E-40dd-AFC4-6F175D3DCCD1}">
-              <a14:hiddenFill xmlns="" xmlns:a14="http://schemas.microsoft.com/office/drawing/2010/main">
+              <a14:hiddenFill xmlns:a14="http://schemas.microsoft.com/office/drawing/2010/main" xmlns="">
                 <a:solidFill>
                   <a:srgbClr val="FFFFFF"/>
                 </a:solidFill>
@@ -3615,10 +3615,10 @@
           </a:ln>
           <a:extLst>
             <a:ext uri="{FAA26D3D-D897-4be2-8F04-BA451C77F1D7}">
-              <ma14:placeholderFlag xmlns="" xmlns:ma14="http://schemas.microsoft.com/office/mac/drawingml/2011/main" val="1"/>
+              <ma14:placeholderFlag xmlns:ma14="http://schemas.microsoft.com/office/mac/drawingml/2011/main" xmlns="" val="1"/>
             </a:ext>
             <a:ext uri="{909E8E84-426E-40dd-AFC4-6F175D3DCCD1}">
-              <a14:hiddenFill xmlns="" xmlns:a14="http://schemas.microsoft.com/office/drawing/2010/main">
+              <a14:hiddenFill xmlns:a14="http://schemas.microsoft.com/office/drawing/2010/main" xmlns="">
                 <a:solidFill>
                   <a:srgbClr val="FFFFFF"/>
                 </a:solidFill>
@@ -12947,7 +12947,7 @@
                 </a:solidFill>
                 <a:latin typeface="Arial"/>
               </a:rPr>
-              <a:t>Target Cluster</a:t>
+              <a:t>Event Streams Target Cluster</a:t>
             </a:r>
           </a:p>
         </p:txBody>
@@ -16150,6 +16150,36 @@
           </a:p>
         </p:txBody>
       </p:sp>
+      <p:pic>
+        <p:nvPicPr>
+          <p:cNvPr id="74" name="Picture 73" descr="A picture containing sign, clock&#10;&#10;Description automatically generated">
+            <a:extLst>
+              <a:ext uri="{FF2B5EF4-FFF2-40B4-BE49-F238E27FC236}">
+                <a16:creationId xmlns:a16="http://schemas.microsoft.com/office/drawing/2014/main" id="{7CB3EBED-680A-5047-9DD5-9ADFD165BBF4}"/>
+              </a:ext>
+            </a:extLst>
+          </p:cNvPr>
+          <p:cNvPicPr>
+            <a:picLocks noChangeAspect="1"/>
+          </p:cNvPicPr>
+          <p:nvPr/>
+        </p:nvPicPr>
+        <p:blipFill>
+          <a:blip r:embed="rId5"/>
+          <a:stretch>
+            <a:fillRect/>
+          </a:stretch>
+        </p:blipFill>
+        <p:spPr>
+          <a:xfrm>
+            <a:off x="8394478" y="1071776"/>
+            <a:ext cx="397442" cy="351885"/>
+          </a:xfrm>
+          <a:prstGeom prst="rect">
+            <a:avLst/>
+          </a:prstGeom>
+        </p:spPr>
+      </p:pic>
     </p:spTree>
     <p:extLst>
       <p:ext uri="{BB962C8B-B14F-4D97-AF65-F5344CB8AC3E}">
@@ -18255,36 +18285,6 @@
           </a:p>
         </p:txBody>
       </p:sp>
-      <p:pic>
-        <p:nvPicPr>
-          <p:cNvPr id="3" name="Picture 2">
-            <a:extLst>
-              <a:ext uri="{FF2B5EF4-FFF2-40B4-BE49-F238E27FC236}">
-                <a16:creationId xmlns:a16="http://schemas.microsoft.com/office/drawing/2014/main" id="{6897ECA9-F27F-1B4B-A567-00FA2BA8DB10}"/>
-              </a:ext>
-            </a:extLst>
-          </p:cNvPr>
-          <p:cNvPicPr>
-            <a:picLocks noChangeAspect="1"/>
-          </p:cNvPicPr>
-          <p:nvPr/>
-        </p:nvPicPr>
-        <p:blipFill>
-          <a:blip r:embed="rId4"/>
-          <a:stretch>
-            <a:fillRect/>
-          </a:stretch>
-        </p:blipFill>
-        <p:spPr>
-          <a:xfrm>
-            <a:off x="511363" y="1939213"/>
-            <a:ext cx="376238" cy="371475"/>
-          </a:xfrm>
-          <a:prstGeom prst="rect">
-            <a:avLst/>
-          </a:prstGeom>
-        </p:spPr>
-      </p:pic>
       <p:pic>
         <p:nvPicPr>
           <p:cNvPr id="37" name="Picture 36">
@@ -19789,8 +19789,8 @@
         </p:nvCxnSpPr>
         <p:spPr>
           <a:xfrm rot="5400000" flipH="1" flipV="1">
-            <a:off x="1155425" y="2194620"/>
-            <a:ext cx="667781" cy="371683"/>
+            <a:off x="1212794" y="2164582"/>
+            <a:ext cx="580375" cy="344352"/>
           </a:xfrm>
           <a:prstGeom prst="bentConnector3">
             <a:avLst>
@@ -19962,6 +19962,72 @@
           </a:p>
         </p:txBody>
       </p:sp>
+      <p:pic>
+        <p:nvPicPr>
+          <p:cNvPr id="71" name="Picture 70" descr="A picture containing sign, clock&#10;&#10;Description automatically generated">
+            <a:extLst>
+              <a:ext uri="{FF2B5EF4-FFF2-40B4-BE49-F238E27FC236}">
+                <a16:creationId xmlns:a16="http://schemas.microsoft.com/office/drawing/2014/main" id="{7908A8B9-9BE3-D342-9BAF-8EF0C1CD40BC}"/>
+              </a:ext>
+            </a:extLst>
+          </p:cNvPr>
+          <p:cNvPicPr>
+            <a:picLocks noChangeAspect="1"/>
+          </p:cNvPicPr>
+          <p:nvPr/>
+        </p:nvPicPr>
+        <p:blipFill>
+          <a:blip r:embed="rId5"/>
+          <a:stretch>
+            <a:fillRect/>
+          </a:stretch>
+        </p:blipFill>
+        <p:spPr>
+          <a:xfrm>
+            <a:off x="8394478" y="1071776"/>
+            <a:ext cx="397442" cy="351885"/>
+          </a:xfrm>
+          <a:prstGeom prst="rect">
+            <a:avLst/>
+          </a:prstGeom>
+        </p:spPr>
+      </p:pic>
+      <p:pic>
+        <p:nvPicPr>
+          <p:cNvPr id="72" name="Picture 71">
+            <a:extLst>
+              <a:ext uri="{FF2B5EF4-FFF2-40B4-BE49-F238E27FC236}">
+                <a16:creationId xmlns:a16="http://schemas.microsoft.com/office/drawing/2014/main" id="{7AA36845-A2F6-2543-821D-F06C70CC4B8C}"/>
+              </a:ext>
+            </a:extLst>
+          </p:cNvPr>
+          <p:cNvPicPr>
+            <a:picLocks noChangeAspect="1"/>
+          </p:cNvPicPr>
+          <p:nvPr/>
+        </p:nvPicPr>
+        <p:blipFill>
+          <a:blip r:embed="rId2">
+            <a:extLst>
+              <a:ext uri="{28A0092B-C50C-407E-A947-70E740481C1C}">
+                <a14:useLocalDpi xmlns:a14="http://schemas.microsoft.com/office/drawing/2010/main" val="0"/>
+              </a:ext>
+            </a:extLst>
+          </a:blip>
+          <a:stretch>
+            <a:fillRect/>
+          </a:stretch>
+        </p:blipFill>
+        <p:spPr>
+          <a:xfrm>
+            <a:off x="597072" y="2023769"/>
+            <a:ext cx="191007" cy="252252"/>
+          </a:xfrm>
+          <a:prstGeom prst="rect">
+            <a:avLst/>
+          </a:prstGeom>
+        </p:spPr>
+      </p:pic>
     </p:spTree>
     <p:extLst>
       <p:ext uri="{BB962C8B-B14F-4D97-AF65-F5344CB8AC3E}">
@@ -23893,6 +23959,66 @@
           </a:p>
         </p:txBody>
       </p:sp>
+      <p:pic>
+        <p:nvPicPr>
+          <p:cNvPr id="40" name="Picture 39">
+            <a:extLst>
+              <a:ext uri="{FF2B5EF4-FFF2-40B4-BE49-F238E27FC236}">
+                <a16:creationId xmlns:a16="http://schemas.microsoft.com/office/drawing/2014/main" id="{B2E3B02B-700F-1948-ADEA-CB5FC76BE11D}"/>
+              </a:ext>
+            </a:extLst>
+          </p:cNvPr>
+          <p:cNvPicPr>
+            <a:picLocks noChangeAspect="1"/>
+          </p:cNvPicPr>
+          <p:nvPr/>
+        </p:nvPicPr>
+        <p:blipFill>
+          <a:blip r:embed="rId4"/>
+          <a:stretch>
+            <a:fillRect/>
+          </a:stretch>
+        </p:blipFill>
+        <p:spPr>
+          <a:xfrm>
+            <a:off x="356381" y="3625830"/>
+            <a:ext cx="261023" cy="238649"/>
+          </a:xfrm>
+          <a:prstGeom prst="rect">
+            <a:avLst/>
+          </a:prstGeom>
+        </p:spPr>
+      </p:pic>
+      <p:pic>
+        <p:nvPicPr>
+          <p:cNvPr id="41" name="Picture 40" descr="A picture containing sign, clock&#10;&#10;Description automatically generated">
+            <a:extLst>
+              <a:ext uri="{FF2B5EF4-FFF2-40B4-BE49-F238E27FC236}">
+                <a16:creationId xmlns:a16="http://schemas.microsoft.com/office/drawing/2014/main" id="{AD7ADB04-28C0-0E48-A740-348F31B8ADCD}"/>
+              </a:ext>
+            </a:extLst>
+          </p:cNvPr>
+          <p:cNvPicPr>
+            <a:picLocks noChangeAspect="1"/>
+          </p:cNvPicPr>
+          <p:nvPr/>
+        </p:nvPicPr>
+        <p:blipFill>
+          <a:blip r:embed="rId5"/>
+          <a:stretch>
+            <a:fillRect/>
+          </a:stretch>
+        </p:blipFill>
+        <p:spPr>
+          <a:xfrm>
+            <a:off x="8026345" y="1071776"/>
+            <a:ext cx="397442" cy="351885"/>
+          </a:xfrm>
+          <a:prstGeom prst="rect">
+            <a:avLst/>
+          </a:prstGeom>
+        </p:spPr>
+      </p:pic>
     </p:spTree>
     <p:extLst>
       <p:ext uri="{BB962C8B-B14F-4D97-AF65-F5344CB8AC3E}">
@@ -24770,7 +24896,7 @@
         <p:spPr bwMode="auto">
           <a:xfrm>
             <a:off x="4935506" y="1499732"/>
-            <a:ext cx="3074603" cy="745927"/>
+            <a:ext cx="3333325" cy="745927"/>
           </a:xfrm>
           <a:prstGeom prst="roundRect">
             <a:avLst>
@@ -25465,7 +25591,7 @@
                 </a:solidFill>
                 <a:latin typeface="Arial"/>
               </a:rPr>
-              <a:t>kafka-console-consumer.sh</a:t>
+              <a:t>Consumer</a:t>
             </a:r>
           </a:p>
         </p:txBody>
@@ -25572,36 +25698,6 @@
           </a:p>
         </p:txBody>
       </p:sp>
-      <p:pic>
-        <p:nvPicPr>
-          <p:cNvPr id="3" name="Picture 2">
-            <a:extLst>
-              <a:ext uri="{FF2B5EF4-FFF2-40B4-BE49-F238E27FC236}">
-                <a16:creationId xmlns:a16="http://schemas.microsoft.com/office/drawing/2014/main" id="{6897ECA9-F27F-1B4B-A567-00FA2BA8DB10}"/>
-              </a:ext>
-            </a:extLst>
-          </p:cNvPr>
-          <p:cNvPicPr>
-            <a:picLocks noChangeAspect="1"/>
-          </p:cNvPicPr>
-          <p:nvPr/>
-        </p:nvPicPr>
-        <p:blipFill>
-          <a:blip r:embed="rId2"/>
-          <a:stretch>
-            <a:fillRect/>
-          </a:stretch>
-        </p:blipFill>
-        <p:spPr>
-          <a:xfrm>
-            <a:off x="511363" y="1939213"/>
-            <a:ext cx="376238" cy="371475"/>
-          </a:xfrm>
-          <a:prstGeom prst="rect">
-            <a:avLst/>
-          </a:prstGeom>
-        </p:spPr>
-      </p:pic>
       <p:pic>
         <p:nvPicPr>
           <p:cNvPr id="37" name="Picture 36">
@@ -25880,7 +25976,7 @@
         </p:nvSpPr>
         <p:spPr>
           <a:xfrm>
-            <a:off x="2236351" y="3405569"/>
+            <a:off x="6525686" y="2970111"/>
             <a:ext cx="1218911" cy="371475"/>
           </a:xfrm>
           <a:prstGeom prst="roundRect">
@@ -25928,7 +26024,7 @@
                 </a:solidFill>
                 <a:latin typeface="Arial"/>
               </a:rPr>
-              <a:t>kafka-console-producer.sh</a:t>
+              <a:t>Producer</a:t>
             </a:r>
           </a:p>
         </p:txBody>
@@ -25990,18 +26086,20 @@
           </p:cNvPr>
           <p:cNvCxnSpPr>
             <a:cxnSpLocks/>
-            <a:stCxn id="49" idx="3"/>
+            <a:stCxn id="49" idx="0"/>
             <a:endCxn id="13" idx="2"/>
           </p:cNvCxnSpPr>
           <p:nvPr/>
         </p:nvCxnSpPr>
         <p:spPr>
-          <a:xfrm flipV="1">
-            <a:off x="3455262" y="2046055"/>
-            <a:ext cx="2841797" cy="1545251"/>
-          </a:xfrm>
-          <a:prstGeom prst="bentConnector2">
-            <a:avLst/>
+          <a:xfrm rot="16200000" flipV="1">
+            <a:off x="6254073" y="2089041"/>
+            <a:ext cx="924056" cy="838083"/>
+          </a:xfrm>
+          <a:prstGeom prst="bentConnector3">
+            <a:avLst>
+              <a:gd name="adj1" fmla="val 50000"/>
+            </a:avLst>
           </a:prstGeom>
           <a:ln>
             <a:solidFill>
@@ -26095,7 +26193,7 @@
         </p:nvSpPr>
         <p:spPr>
           <a:xfrm>
-            <a:off x="3334249" y="3625830"/>
+            <a:off x="6317439" y="2990978"/>
             <a:ext cx="322730" cy="308102"/>
           </a:xfrm>
           <a:prstGeom prst="ellipse">
@@ -26263,10 +26361,10 @@
       </p:sp>
       <p:pic>
         <p:nvPicPr>
-          <p:cNvPr id="40" name="Picture 39">
-            <a:extLst>
-              <a:ext uri="{FF2B5EF4-FFF2-40B4-BE49-F238E27FC236}">
-                <a16:creationId xmlns:a16="http://schemas.microsoft.com/office/drawing/2014/main" id="{55D0F98F-B902-9942-A2EC-ED7716144A37}"/>
+          <p:cNvPr id="41" name="Picture 40">
+            <a:extLst>
+              <a:ext uri="{FF2B5EF4-FFF2-40B4-BE49-F238E27FC236}">
+                <a16:creationId xmlns:a16="http://schemas.microsoft.com/office/drawing/2014/main" id="{56C25C81-9BFA-624C-9CA8-B1ED9F6886F8}"/>
               </a:ext>
             </a:extLst>
           </p:cNvPr>
@@ -26276,15 +26374,198 @@
           <p:nvPr/>
         </p:nvPicPr>
         <p:blipFill>
-          <a:blip r:embed="rId2"/>
+          <a:blip r:embed="rId3">
+            <a:extLst>
+              <a:ext uri="{28A0092B-C50C-407E-A947-70E740481C1C}">
+                <a14:useLocalDpi xmlns:a14="http://schemas.microsoft.com/office/drawing/2010/main" val="0"/>
+              </a:ext>
+            </a:extLst>
+          </a:blip>
           <a:stretch>
             <a:fillRect/>
           </a:stretch>
         </p:blipFill>
         <p:spPr>
           <a:xfrm>
-            <a:off x="4913974" y="1938698"/>
-            <a:ext cx="376238" cy="371475"/>
+            <a:off x="4945417" y="1503235"/>
+            <a:ext cx="191007" cy="252252"/>
+          </a:xfrm>
+          <a:prstGeom prst="rect">
+            <a:avLst/>
+          </a:prstGeom>
+        </p:spPr>
+      </p:pic>
+      <p:pic>
+        <p:nvPicPr>
+          <p:cNvPr id="42" name="Picture 41">
+            <a:extLst>
+              <a:ext uri="{FF2B5EF4-FFF2-40B4-BE49-F238E27FC236}">
+                <a16:creationId xmlns:a16="http://schemas.microsoft.com/office/drawing/2014/main" id="{68211D15-A32F-8943-9E1A-48A59F5DFCD2}"/>
+              </a:ext>
+            </a:extLst>
+          </p:cNvPr>
+          <p:cNvPicPr>
+            <a:picLocks noChangeAspect="1"/>
+          </p:cNvPicPr>
+          <p:nvPr/>
+        </p:nvPicPr>
+        <p:blipFill>
+          <a:blip r:embed="rId3">
+            <a:extLst>
+              <a:ext uri="{28A0092B-C50C-407E-A947-70E740481C1C}">
+                <a14:useLocalDpi xmlns:a14="http://schemas.microsoft.com/office/drawing/2010/main" val="0"/>
+              </a:ext>
+            </a:extLst>
+          </a:blip>
+          <a:stretch>
+            <a:fillRect/>
+          </a:stretch>
+        </p:blipFill>
+        <p:spPr>
+          <a:xfrm>
+            <a:off x="632701" y="1536885"/>
+            <a:ext cx="191007" cy="252252"/>
+          </a:xfrm>
+          <a:prstGeom prst="rect">
+            <a:avLst/>
+          </a:prstGeom>
+        </p:spPr>
+      </p:pic>
+      <p:pic>
+        <p:nvPicPr>
+          <p:cNvPr id="43" name="Picture 42">
+            <a:extLst>
+              <a:ext uri="{FF2B5EF4-FFF2-40B4-BE49-F238E27FC236}">
+                <a16:creationId xmlns:a16="http://schemas.microsoft.com/office/drawing/2014/main" id="{17C8EA92-3D3A-6646-A77F-C2E199089CD1}"/>
+              </a:ext>
+            </a:extLst>
+          </p:cNvPr>
+          <p:cNvPicPr>
+            <a:picLocks noChangeAspect="1"/>
+          </p:cNvPicPr>
+          <p:nvPr/>
+        </p:nvPicPr>
+        <p:blipFill>
+          <a:blip r:embed="rId4"/>
+          <a:stretch>
+            <a:fillRect/>
+          </a:stretch>
+        </p:blipFill>
+        <p:spPr>
+          <a:xfrm>
+            <a:off x="356381" y="3625830"/>
+            <a:ext cx="261023" cy="238649"/>
+          </a:xfrm>
+          <a:prstGeom prst="rect">
+            <a:avLst/>
+          </a:prstGeom>
+        </p:spPr>
+      </p:pic>
+      <p:sp>
+        <p:nvSpPr>
+          <p:cNvPr id="47" name="AutoShape 4">
+            <a:extLst>
+              <a:ext uri="{FF2B5EF4-FFF2-40B4-BE49-F238E27FC236}">
+                <a16:creationId xmlns:a16="http://schemas.microsoft.com/office/drawing/2014/main" id="{A00EABA6-52E6-B747-BCD6-7A397FE9059C}"/>
+              </a:ext>
+            </a:extLst>
+          </p:cNvPr>
+          <p:cNvSpPr>
+            <a:spLocks noChangeArrowheads="1"/>
+          </p:cNvSpPr>
+          <p:nvPr/>
+        </p:nvSpPr>
+        <p:spPr bwMode="auto">
+          <a:xfrm>
+            <a:off x="4945416" y="2790647"/>
+            <a:ext cx="3333325" cy="814403"/>
+          </a:xfrm>
+          <a:prstGeom prst="roundRect">
+            <a:avLst>
+              <a:gd name="adj" fmla="val 3325"/>
+            </a:avLst>
+          </a:prstGeom>
+          <a:noFill/>
+          <a:ln w="12700">
+            <a:solidFill>
+              <a:schemeClr val="accent3"/>
+            </a:solidFill>
+            <a:prstDash val="dash"/>
+            <a:round/>
+            <a:headEnd/>
+            <a:tailEnd/>
+          </a:ln>
+        </p:spPr>
+        <p:txBody>
+          <a:bodyPr lIns="0" tIns="0" rIns="0" bIns="0" anchor="b" anchorCtr="1"/>
+          <a:lstStyle/>
+          <a:p>
+            <a:pPr algn="ctr"/>
+            <a:r>
+              <a:rPr lang="en-US" sz="750" dirty="0" err="1"/>
+              <a:t>Openshifr</a:t>
+            </a:r>
+            <a:r>
+              <a:rPr lang="en-US" sz="750" dirty="0"/>
+              <a:t> on Kubernetes Service</a:t>
+            </a:r>
+          </a:p>
+        </p:txBody>
+      </p:sp>
+      <p:pic>
+        <p:nvPicPr>
+          <p:cNvPr id="48" name="Picture 47">
+            <a:extLst>
+              <a:ext uri="{FF2B5EF4-FFF2-40B4-BE49-F238E27FC236}">
+                <a16:creationId xmlns:a16="http://schemas.microsoft.com/office/drawing/2014/main" id="{D9A1D566-7274-254B-B86D-75F32B5130BE}"/>
+              </a:ext>
+            </a:extLst>
+          </p:cNvPr>
+          <p:cNvPicPr>
+            <a:picLocks noChangeAspect="1"/>
+          </p:cNvPicPr>
+          <p:nvPr/>
+        </p:nvPicPr>
+        <p:blipFill>
+          <a:blip r:embed="rId4"/>
+          <a:stretch>
+            <a:fillRect/>
+          </a:stretch>
+        </p:blipFill>
+        <p:spPr>
+          <a:xfrm>
+            <a:off x="4938273" y="3386344"/>
+            <a:ext cx="261023" cy="238649"/>
+          </a:xfrm>
+          <a:prstGeom prst="rect">
+            <a:avLst/>
+          </a:prstGeom>
+        </p:spPr>
+      </p:pic>
+      <p:pic>
+        <p:nvPicPr>
+          <p:cNvPr id="50" name="Picture 49" descr="A picture containing sign, clock&#10;&#10;Description automatically generated">
+            <a:extLst>
+              <a:ext uri="{FF2B5EF4-FFF2-40B4-BE49-F238E27FC236}">
+                <a16:creationId xmlns:a16="http://schemas.microsoft.com/office/drawing/2014/main" id="{18D36C91-09E9-144D-BA4D-78F0917B3606}"/>
+              </a:ext>
+            </a:extLst>
+          </p:cNvPr>
+          <p:cNvPicPr>
+            <a:picLocks noChangeAspect="1"/>
+          </p:cNvPicPr>
+          <p:nvPr/>
+        </p:nvPicPr>
+        <p:blipFill>
+          <a:blip r:embed="rId5"/>
+          <a:stretch>
+            <a:fillRect/>
+          </a:stretch>
+        </p:blipFill>
+        <p:spPr>
+          <a:xfrm>
+            <a:off x="8002594" y="1071776"/>
+            <a:ext cx="397442" cy="351885"/>
           </a:xfrm>
           <a:prstGeom prst="rect">
             <a:avLst/>

</xml_diff>